<commit_message>
Various fixes to the slides
</commit_message>
<xml_diff>
--- a/guillermo/guillermo-proposal-slides.pptx
+++ b/guillermo/guillermo-proposal-slides.pptx
@@ -13708,21 +13708,13 @@
           <a:p>
             <a:r>
               <a:rPr lang="en-US" dirty="0"/>
-              <a:t>While the cognition and reflexive components are proven concepts, cognition is not.</a:t>
+              <a:t>While the cognition and reflexive components are proven concepts, intuition is not.</a:t>
             </a:r>
           </a:p>
           <a:p>
             <a:r>
               <a:rPr lang="en-US" dirty="0"/>
-              <a:t>Potential solution: Fixed Frame Count </a:t>
-            </a:r>
-            <a:r>
-              <a:rPr lang="en-US" dirty="0" err="1"/>
-              <a:t>Intution</a:t>
-            </a:r>
-            <a:r>
-              <a:rPr lang="en-US" dirty="0"/>
-              <a:t> Network.</a:t>
+              <a:t>Potential solution: Fixed Frame Count Intuition Network.</a:t>
             </a:r>
           </a:p>
           <a:p>

</xml_diff>